<commit_message>
Content of Class-5 added
</commit_message>
<xml_diff>
--- a/Course_Content/Class-3/Py-Workshop-3-.pptx
+++ b/Course_Content/Class-3/Py-Workshop-3-.pptx
@@ -207,7 +207,7 @@
           <a:p>
             <a:fld id="{EF809499-2DF9-44F9-B72F-F90B6DEBF4BD}" type="datetimeFigureOut">
               <a:rPr lang="en-US" smtClean="0"/>
-              <a:t>8/6/2019</a:t>
+              <a:t>8/26/2019</a:t>
             </a:fld>
             <a:endParaRPr lang="en-US"/>
           </a:p>
@@ -886,6 +886,15 @@
               <a:t> </a:t>
             </a:r>
           </a:p>
+          <a:p>
+            <a:r>
+              <a:rPr lang="en-US" dirty="0">
+                <a:hlinkClick r:id="rId3"/>
+              </a:rPr>
+              <a:t>https://docs.python.org/3/tutorial/errors.html</a:t>
+            </a:r>
+            <a:endParaRPr lang="en-US" dirty="0"/>
+          </a:p>
         </p:txBody>
       </p:sp>
       <p:sp>
@@ -1255,7 +1264,7 @@
           <a:p>
             <a:fld id="{CADC3B33-C7A6-400C-A955-5B352DDD6EAE}" type="datetimeFigureOut">
               <a:rPr lang="en-US" smtClean="0"/>
-              <a:t>8/6/2019</a:t>
+              <a:t>8/26/2019</a:t>
             </a:fld>
             <a:endParaRPr lang="en-US"/>
           </a:p>
@@ -1425,7 +1434,7 @@
           <a:p>
             <a:fld id="{CADC3B33-C7A6-400C-A955-5B352DDD6EAE}" type="datetimeFigureOut">
               <a:rPr lang="en-US" smtClean="0"/>
-              <a:t>8/6/2019</a:t>
+              <a:t>8/26/2019</a:t>
             </a:fld>
             <a:endParaRPr lang="en-US"/>
           </a:p>
@@ -1605,7 +1614,7 @@
           <a:p>
             <a:fld id="{CADC3B33-C7A6-400C-A955-5B352DDD6EAE}" type="datetimeFigureOut">
               <a:rPr lang="en-US" smtClean="0"/>
-              <a:t>8/6/2019</a:t>
+              <a:t>8/26/2019</a:t>
             </a:fld>
             <a:endParaRPr lang="en-US"/>
           </a:p>
@@ -1775,7 +1784,7 @@
           <a:p>
             <a:fld id="{CADC3B33-C7A6-400C-A955-5B352DDD6EAE}" type="datetimeFigureOut">
               <a:rPr lang="en-US" smtClean="0"/>
-              <a:t>8/6/2019</a:t>
+              <a:t>8/26/2019</a:t>
             </a:fld>
             <a:endParaRPr lang="en-US"/>
           </a:p>
@@ -2019,7 +2028,7 @@
           <a:p>
             <a:fld id="{CADC3B33-C7A6-400C-A955-5B352DDD6EAE}" type="datetimeFigureOut">
               <a:rPr lang="en-US" smtClean="0"/>
-              <a:t>8/6/2019</a:t>
+              <a:t>8/26/2019</a:t>
             </a:fld>
             <a:endParaRPr lang="en-US"/>
           </a:p>
@@ -2251,7 +2260,7 @@
           <a:p>
             <a:fld id="{CADC3B33-C7A6-400C-A955-5B352DDD6EAE}" type="datetimeFigureOut">
               <a:rPr lang="en-US" smtClean="0"/>
-              <a:t>8/6/2019</a:t>
+              <a:t>8/26/2019</a:t>
             </a:fld>
             <a:endParaRPr lang="en-US"/>
           </a:p>
@@ -2618,7 +2627,7 @@
           <a:p>
             <a:fld id="{CADC3B33-C7A6-400C-A955-5B352DDD6EAE}" type="datetimeFigureOut">
               <a:rPr lang="en-US" smtClean="0"/>
-              <a:t>8/6/2019</a:t>
+              <a:t>8/26/2019</a:t>
             </a:fld>
             <a:endParaRPr lang="en-US"/>
           </a:p>
@@ -2736,7 +2745,7 @@
           <a:p>
             <a:fld id="{CADC3B33-C7A6-400C-A955-5B352DDD6EAE}" type="datetimeFigureOut">
               <a:rPr lang="en-US" smtClean="0"/>
-              <a:t>8/6/2019</a:t>
+              <a:t>8/26/2019</a:t>
             </a:fld>
             <a:endParaRPr lang="en-US"/>
           </a:p>
@@ -2831,7 +2840,7 @@
           <a:p>
             <a:fld id="{CADC3B33-C7A6-400C-A955-5B352DDD6EAE}" type="datetimeFigureOut">
               <a:rPr lang="en-US" smtClean="0"/>
-              <a:t>8/6/2019</a:t>
+              <a:t>8/26/2019</a:t>
             </a:fld>
             <a:endParaRPr lang="en-US"/>
           </a:p>
@@ -3108,7 +3117,7 @@
           <a:p>
             <a:fld id="{CADC3B33-C7A6-400C-A955-5B352DDD6EAE}" type="datetimeFigureOut">
               <a:rPr lang="en-US" smtClean="0"/>
-              <a:t>8/6/2019</a:t>
+              <a:t>8/26/2019</a:t>
             </a:fld>
             <a:endParaRPr lang="en-US"/>
           </a:p>
@@ -3365,7 +3374,7 @@
           <a:p>
             <a:fld id="{CADC3B33-C7A6-400C-A955-5B352DDD6EAE}" type="datetimeFigureOut">
               <a:rPr lang="en-US" smtClean="0"/>
-              <a:t>8/6/2019</a:t>
+              <a:t>8/26/2019</a:t>
             </a:fld>
             <a:endParaRPr lang="en-US"/>
           </a:p>
@@ -3578,7 +3587,7 @@
           <a:p>
             <a:fld id="{CADC3B33-C7A6-400C-A955-5B352DDD6EAE}" type="datetimeFigureOut">
               <a:rPr lang="en-US" smtClean="0"/>
-              <a:t>8/6/2019</a:t>
+              <a:t>8/26/2019</a:t>
             </a:fld>
             <a:endParaRPr lang="en-US"/>
           </a:p>
@@ -7009,9 +7018,9 @@
               <a:buChar char="§"/>
             </a:pPr>
             <a:r>
-              <a:rPr lang="en-US" sz="1800" b="1" dirty="0">
-                <a:solidFill>
-                  <a:srgbClr val="C00000"/>
+              <a:rPr lang="en-US" sz="1800" dirty="0">
+                <a:solidFill>
+                  <a:srgbClr val="8B0000"/>
                 </a:solidFill>
                 <a:latin typeface="LMRoman12-Regular"/>
               </a:rPr>
@@ -7085,9 +7094,9 @@
               </a:lnSpc>
             </a:pPr>
             <a:r>
-              <a:rPr lang="en-US" sz="1800" b="1" u="sng" dirty="0">
-                <a:solidFill>
-                  <a:srgbClr val="C00000"/>
+              <a:rPr lang="en-US" sz="1800" u="sng" dirty="0">
+                <a:solidFill>
+                  <a:srgbClr val="8B0000"/>
                 </a:solidFill>
                 <a:latin typeface="LMRoman12-Regular"/>
               </a:rPr>
@@ -8486,7 +8495,7 @@
               <a:buChar char="§"/>
             </a:pPr>
             <a:r>
-              <a:rPr lang="en-US" b="1" dirty="0">
+              <a:rPr lang="en-US" dirty="0">
                 <a:solidFill>
                   <a:srgbClr val="8B0000"/>
                 </a:solidFill>
@@ -8564,7 +8573,7 @@
               <a:buChar char="§"/>
             </a:pPr>
             <a:r>
-              <a:rPr lang="en-US" b="1" dirty="0">
+              <a:rPr lang="en-US" dirty="0">
                 <a:solidFill>
                   <a:srgbClr val="8B0000"/>
                 </a:solidFill>
@@ -9529,9 +9538,9 @@
           <a:lstStyle/>
           <a:p>
             <a:r>
-              <a:rPr lang="en-US" sz="2000" b="1" dirty="0">
-                <a:solidFill>
-                  <a:srgbClr val="C00000"/>
+              <a:rPr lang="en-US" sz="2000" dirty="0">
+                <a:solidFill>
+                  <a:srgbClr val="8B0000"/>
                 </a:solidFill>
                 <a:latin typeface="LMRoman12-Regular"/>
               </a:rPr>
@@ -9557,9 +9566,9 @@
           </a:p>
           <a:p>
             <a:r>
-              <a:rPr lang="en-US" sz="2000" b="1" dirty="0">
-                <a:solidFill>
-                  <a:srgbClr val="C00000"/>
+              <a:rPr lang="en-US" sz="2000" dirty="0">
+                <a:solidFill>
+                  <a:srgbClr val="8B0000"/>
                 </a:solidFill>
                 <a:latin typeface="LMRoman12-Regular"/>
               </a:rPr>

</xml_diff>